<commit_message>
editing ch. 2 slides
</commit_message>
<xml_diff>
--- a/ppts/Chapter 2 Slides.pptx
+++ b/ppts/Chapter 2 Slides.pptx
@@ -5,7 +5,7 @@
     <p:sldMasterId id="2147483660" r:id="rId1"/>
   </p:sldMasterIdLst>
   <p:notesMasterIdLst>
-    <p:notesMasterId r:id="rId13"/>
+    <p:notesMasterId r:id="rId18"/>
   </p:notesMasterIdLst>
   <p:sldIdLst>
     <p:sldId id="256" r:id="rId2"/>
@@ -19,6 +19,11 @@
     <p:sldId id="264" r:id="rId10"/>
     <p:sldId id="265" r:id="rId11"/>
     <p:sldId id="266" r:id="rId12"/>
+    <p:sldId id="267" r:id="rId13"/>
+    <p:sldId id="269" r:id="rId14"/>
+    <p:sldId id="270" r:id="rId15"/>
+    <p:sldId id="271" r:id="rId16"/>
+    <p:sldId id="268" r:id="rId17"/>
   </p:sldIdLst>
   <p:sldSz cx="9144000" cy="6858000" type="screen4x3"/>
   <p:notesSz cx="6858000" cy="9144000"/>
@@ -117,6 +122,22 @@
       </a:defRPr>
     </a:lvl9pPr>
   </p:defaultTextStyle>
+  <p:extLst>
+    <p:ext uri="{EFAFB233-063F-42B5-8137-9DF3F51BA10A}">
+      <p15:sldGuideLst xmlns:p15="http://schemas.microsoft.com/office/powerpoint/2012/main" xmlns="">
+        <p15:guide id="1" orient="horz" pos="2160">
+          <p15:clr>
+            <a:srgbClr val="A4A3A4"/>
+          </p15:clr>
+        </p15:guide>
+        <p15:guide id="2" pos="2880">
+          <p15:clr>
+            <a:srgbClr val="A4A3A4"/>
+          </p15:clr>
+        </p15:guide>
+      </p15:sldGuideLst>
+    </p:ext>
+  </p:extLst>
 </p:presentation>
 </file>
 
@@ -202,7 +223,7 @@
           <a:p>
             <a:fld id="{A875C063-02D5-2B46-9C85-346D4D5535FE}" type="datetimeFigureOut">
               <a:rPr lang="en-US" smtClean="0"/>
-              <a:t>8/23/16</a:t>
+              <a:t>9/12/16</a:t>
             </a:fld>
             <a:endParaRPr lang="en-US"/>
           </a:p>
@@ -756,6 +777,401 @@
 </p:notes>
 </file>
 
+<file path=ppt/notesSlides/notesSlide4.xml><?xml version="1.0" encoding="utf-8"?>
+<p:notes xmlns:a="http://schemas.openxmlformats.org/drawingml/2006/main" xmlns:r="http://schemas.openxmlformats.org/officeDocument/2006/relationships" xmlns:p="http://schemas.openxmlformats.org/presentationml/2006/main">
+  <p:cSld>
+    <p:spTree>
+      <p:nvGrpSpPr>
+        <p:cNvPr id="1" name=""/>
+        <p:cNvGrpSpPr/>
+        <p:nvPr/>
+      </p:nvGrpSpPr>
+      <p:grpSpPr>
+        <a:xfrm>
+          <a:off x="0" y="0"/>
+          <a:ext cx="0" cy="0"/>
+          <a:chOff x="0" y="0"/>
+          <a:chExt cx="0" cy="0"/>
+        </a:xfrm>
+      </p:grpSpPr>
+      <p:sp>
+        <p:nvSpPr>
+          <p:cNvPr id="2" name="Slide Image Placeholder 1"/>
+          <p:cNvSpPr>
+            <a:spLocks noGrp="1" noRot="1" noChangeAspect="1"/>
+          </p:cNvSpPr>
+          <p:nvPr>
+            <p:ph type="sldImg"/>
+          </p:nvPr>
+        </p:nvSpPr>
+        <p:spPr/>
+      </p:sp>
+      <p:sp>
+        <p:nvSpPr>
+          <p:cNvPr id="3" name="Notes Placeholder 2"/>
+          <p:cNvSpPr>
+            <a:spLocks noGrp="1"/>
+          </p:cNvSpPr>
+          <p:nvPr>
+            <p:ph type="body" idx="1"/>
+          </p:nvPr>
+        </p:nvSpPr>
+        <p:spPr/>
+        <p:txBody>
+          <a:bodyPr/>
+          <a:lstStyle/>
+          <a:p>
+            <a:pPr marL="0" marR="0" lvl="1" indent="0" algn="l" defTabSz="457200" rtl="0" eaLnBrk="1" fontAlgn="auto" latinLnBrk="0" hangingPunct="1">
+              <a:lnSpc>
+                <a:spcPct val="100000"/>
+              </a:lnSpc>
+              <a:spcBef>
+                <a:spcPts val="0"/>
+              </a:spcBef>
+              <a:spcAft>
+                <a:spcPts val="0"/>
+              </a:spcAft>
+              <a:buClrTx/>
+              <a:buSzTx/>
+              <a:buFontTx/>
+              <a:buNone/>
+              <a:tabLst/>
+              <a:defRPr/>
+            </a:pPr>
+            <a:r>
+              <a:rPr lang="en-US" i="0" dirty="0" smtClean="0"/>
+              <a:t>Grievances rooted in conflicts over claims to rewards and opportunities among groups differentially situated in the social system</a:t>
+            </a:r>
+          </a:p>
+          <a:p>
+            <a:endParaRPr lang="en-US" dirty="0"/>
+          </a:p>
+        </p:txBody>
+      </p:sp>
+      <p:sp>
+        <p:nvSpPr>
+          <p:cNvPr id="4" name="Slide Number Placeholder 3"/>
+          <p:cNvSpPr>
+            <a:spLocks noGrp="1"/>
+          </p:cNvSpPr>
+          <p:nvPr>
+            <p:ph type="sldNum" sz="quarter" idx="10"/>
+          </p:nvPr>
+        </p:nvSpPr>
+        <p:spPr/>
+        <p:txBody>
+          <a:bodyPr/>
+          <a:lstStyle/>
+          <a:p>
+            <a:fld id="{ED8B9EAB-9194-C349-939B-458D4FF5A6A9}" type="slidenum">
+              <a:rPr lang="en-US" smtClean="0"/>
+              <a:t>9</a:t>
+            </a:fld>
+            <a:endParaRPr lang="en-US"/>
+          </a:p>
+        </p:txBody>
+      </p:sp>
+    </p:spTree>
+    <p:extLst>
+      <p:ext uri="{BB962C8B-B14F-4D97-AF65-F5344CB8AC3E}">
+        <p14:creationId xmlns:p14="http://schemas.microsoft.com/office/powerpoint/2010/main" val="1819920057"/>
+      </p:ext>
+    </p:extLst>
+  </p:cSld>
+  <p:clrMapOvr>
+    <a:masterClrMapping/>
+  </p:clrMapOvr>
+</p:notes>
+</file>
+
+<file path=ppt/notesSlides/notesSlide5.xml><?xml version="1.0" encoding="utf-8"?>
+<p:notes xmlns:a="http://schemas.openxmlformats.org/drawingml/2006/main" xmlns:r="http://schemas.openxmlformats.org/officeDocument/2006/relationships" xmlns:p="http://schemas.openxmlformats.org/presentationml/2006/main">
+  <p:cSld>
+    <p:spTree>
+      <p:nvGrpSpPr>
+        <p:cNvPr id="1" name=""/>
+        <p:cNvGrpSpPr/>
+        <p:nvPr/>
+      </p:nvGrpSpPr>
+      <p:grpSpPr>
+        <a:xfrm>
+          <a:off x="0" y="0"/>
+          <a:ext cx="0" cy="0"/>
+          <a:chOff x="0" y="0"/>
+          <a:chExt cx="0" cy="0"/>
+        </a:xfrm>
+      </p:grpSpPr>
+      <p:sp>
+        <p:nvSpPr>
+          <p:cNvPr id="2" name="Slide Image Placeholder 1"/>
+          <p:cNvSpPr>
+            <a:spLocks noGrp="1" noRot="1" noChangeAspect="1"/>
+          </p:cNvSpPr>
+          <p:nvPr>
+            <p:ph type="sldImg"/>
+          </p:nvPr>
+        </p:nvSpPr>
+        <p:spPr/>
+      </p:sp>
+      <p:sp>
+        <p:nvSpPr>
+          <p:cNvPr id="3" name="Notes Placeholder 2"/>
+          <p:cNvSpPr>
+            <a:spLocks noGrp="1"/>
+          </p:cNvSpPr>
+          <p:nvPr>
+            <p:ph type="body" idx="1"/>
+          </p:nvPr>
+        </p:nvSpPr>
+        <p:spPr/>
+        <p:txBody>
+          <a:bodyPr/>
+          <a:lstStyle/>
+          <a:p>
+            <a:r>
+              <a:rPr lang="en-US" dirty="0" smtClean="0"/>
+              <a:t>Weakens</a:t>
+            </a:r>
+            <a:r>
+              <a:rPr lang="en-US" baseline="0" dirty="0" smtClean="0"/>
+              <a:t> social constraints and loosens national fabric</a:t>
+            </a:r>
+            <a:endParaRPr lang="en-US" dirty="0"/>
+          </a:p>
+        </p:txBody>
+      </p:sp>
+      <p:sp>
+        <p:nvSpPr>
+          <p:cNvPr id="4" name="Slide Number Placeholder 3"/>
+          <p:cNvSpPr>
+            <a:spLocks noGrp="1"/>
+          </p:cNvSpPr>
+          <p:nvPr>
+            <p:ph type="sldNum" sz="quarter" idx="10"/>
+          </p:nvPr>
+        </p:nvSpPr>
+        <p:spPr/>
+        <p:txBody>
+          <a:bodyPr/>
+          <a:lstStyle/>
+          <a:p>
+            <a:fld id="{ED8B9EAB-9194-C349-939B-458D4FF5A6A9}" type="slidenum">
+              <a:rPr lang="en-US" smtClean="0"/>
+              <a:t>11</a:t>
+            </a:fld>
+            <a:endParaRPr lang="en-US"/>
+          </a:p>
+        </p:txBody>
+      </p:sp>
+    </p:spTree>
+    <p:extLst>
+      <p:ext uri="{BB962C8B-B14F-4D97-AF65-F5344CB8AC3E}">
+        <p14:creationId xmlns:p14="http://schemas.microsoft.com/office/powerpoint/2010/main" val="3538134952"/>
+      </p:ext>
+    </p:extLst>
+  </p:cSld>
+  <p:clrMapOvr>
+    <a:masterClrMapping/>
+  </p:clrMapOvr>
+</p:notes>
+</file>
+
+<file path=ppt/notesSlides/notesSlide6.xml><?xml version="1.0" encoding="utf-8"?>
+<p:notes xmlns:a="http://schemas.openxmlformats.org/drawingml/2006/main" xmlns:r="http://schemas.openxmlformats.org/officeDocument/2006/relationships" xmlns:p="http://schemas.openxmlformats.org/presentationml/2006/main">
+  <p:cSld>
+    <p:spTree>
+      <p:nvGrpSpPr>
+        <p:cNvPr id="1" name=""/>
+        <p:cNvGrpSpPr/>
+        <p:nvPr/>
+      </p:nvGrpSpPr>
+      <p:grpSpPr>
+        <a:xfrm>
+          <a:off x="0" y="0"/>
+          <a:ext cx="0" cy="0"/>
+          <a:chOff x="0" y="0"/>
+          <a:chExt cx="0" cy="0"/>
+        </a:xfrm>
+      </p:grpSpPr>
+      <p:sp>
+        <p:nvSpPr>
+          <p:cNvPr id="2" name="Slide Image Placeholder 1"/>
+          <p:cNvSpPr>
+            <a:spLocks noGrp="1" noRot="1" noChangeAspect="1"/>
+          </p:cNvSpPr>
+          <p:nvPr>
+            <p:ph type="sldImg"/>
+          </p:nvPr>
+        </p:nvSpPr>
+        <p:spPr/>
+      </p:sp>
+      <p:sp>
+        <p:nvSpPr>
+          <p:cNvPr id="3" name="Notes Placeholder 2"/>
+          <p:cNvSpPr>
+            <a:spLocks noGrp="1"/>
+          </p:cNvSpPr>
+          <p:nvPr>
+            <p:ph type="body" idx="1"/>
+          </p:nvPr>
+        </p:nvSpPr>
+        <p:spPr/>
+        <p:txBody>
+          <a:bodyPr/>
+          <a:lstStyle/>
+          <a:p>
+            <a:r>
+              <a:rPr lang="en-US" dirty="0" smtClean="0"/>
+              <a:t>Weakens</a:t>
+            </a:r>
+            <a:r>
+              <a:rPr lang="en-US" baseline="0" dirty="0" smtClean="0"/>
+              <a:t> social constraints and loosens national fabric</a:t>
+            </a:r>
+            <a:endParaRPr lang="en-US" dirty="0"/>
+          </a:p>
+        </p:txBody>
+      </p:sp>
+      <p:sp>
+        <p:nvSpPr>
+          <p:cNvPr id="4" name="Slide Number Placeholder 3"/>
+          <p:cNvSpPr>
+            <a:spLocks noGrp="1"/>
+          </p:cNvSpPr>
+          <p:nvPr>
+            <p:ph type="sldNum" sz="quarter" idx="10"/>
+          </p:nvPr>
+        </p:nvSpPr>
+        <p:spPr/>
+        <p:txBody>
+          <a:bodyPr/>
+          <a:lstStyle/>
+          <a:p>
+            <a:fld id="{ED8B9EAB-9194-C349-939B-458D4FF5A6A9}" type="slidenum">
+              <a:rPr lang="en-US" smtClean="0"/>
+              <a:t>13</a:t>
+            </a:fld>
+            <a:endParaRPr lang="en-US"/>
+          </a:p>
+        </p:txBody>
+      </p:sp>
+    </p:spTree>
+    <p:extLst>
+      <p:ext uri="{BB962C8B-B14F-4D97-AF65-F5344CB8AC3E}">
+        <p14:creationId xmlns:p14="http://schemas.microsoft.com/office/powerpoint/2010/main" val="3538134952"/>
+      </p:ext>
+    </p:extLst>
+  </p:cSld>
+  <p:clrMapOvr>
+    <a:masterClrMapping/>
+  </p:clrMapOvr>
+</p:notes>
+</file>
+
+<file path=ppt/notesSlides/notesSlide7.xml><?xml version="1.0" encoding="utf-8"?>
+<p:notes xmlns:a="http://schemas.openxmlformats.org/drawingml/2006/main" xmlns:r="http://schemas.openxmlformats.org/officeDocument/2006/relationships" xmlns:p="http://schemas.openxmlformats.org/presentationml/2006/main">
+  <p:cSld>
+    <p:spTree>
+      <p:nvGrpSpPr>
+        <p:cNvPr id="1" name=""/>
+        <p:cNvGrpSpPr/>
+        <p:nvPr/>
+      </p:nvGrpSpPr>
+      <p:grpSpPr>
+        <a:xfrm>
+          <a:off x="0" y="0"/>
+          <a:ext cx="0" cy="0"/>
+          <a:chOff x="0" y="0"/>
+          <a:chExt cx="0" cy="0"/>
+        </a:xfrm>
+      </p:grpSpPr>
+      <p:sp>
+        <p:nvSpPr>
+          <p:cNvPr id="2" name="Slide Image Placeholder 1"/>
+          <p:cNvSpPr>
+            <a:spLocks noGrp="1" noRot="1" noChangeAspect="1"/>
+          </p:cNvSpPr>
+          <p:nvPr>
+            <p:ph type="sldImg"/>
+          </p:nvPr>
+        </p:nvSpPr>
+        <p:spPr/>
+      </p:sp>
+      <p:sp>
+        <p:nvSpPr>
+          <p:cNvPr id="3" name="Notes Placeholder 2"/>
+          <p:cNvSpPr>
+            <a:spLocks noGrp="1"/>
+          </p:cNvSpPr>
+          <p:nvPr>
+            <p:ph type="body" idx="1"/>
+          </p:nvPr>
+        </p:nvSpPr>
+        <p:spPr/>
+        <p:txBody>
+          <a:bodyPr/>
+          <a:lstStyle/>
+          <a:p>
+            <a:r>
+              <a:rPr lang="en-US" dirty="0" smtClean="0"/>
+              <a:t>Both actual</a:t>
+            </a:r>
+            <a:r>
+              <a:rPr lang="en-US" baseline="0" dirty="0" smtClean="0"/>
+              <a:t> and threatened loss in the quotidian are enough to spur action. </a:t>
+            </a:r>
+            <a:r>
+              <a:rPr lang="en-US" baseline="0" dirty="0" err="1" smtClean="0"/>
+              <a:t>Ppl</a:t>
+            </a:r>
+            <a:r>
+              <a:rPr lang="en-US" baseline="0" dirty="0" smtClean="0"/>
+              <a:t> are motivated to recoup what they have already lost or guard against the prospect </a:t>
+            </a:r>
+            <a:r>
+              <a:rPr lang="en-US" baseline="0" smtClean="0"/>
+              <a:t>of such loss</a:t>
+            </a:r>
+            <a:endParaRPr lang="en-US" dirty="0"/>
+          </a:p>
+        </p:txBody>
+      </p:sp>
+      <p:sp>
+        <p:nvSpPr>
+          <p:cNvPr id="4" name="Slide Number Placeholder 3"/>
+          <p:cNvSpPr>
+            <a:spLocks noGrp="1"/>
+          </p:cNvSpPr>
+          <p:nvPr>
+            <p:ph type="sldNum" sz="quarter" idx="10"/>
+          </p:nvPr>
+        </p:nvSpPr>
+        <p:spPr/>
+        <p:txBody>
+          <a:bodyPr/>
+          <a:lstStyle/>
+          <a:p>
+            <a:fld id="{ED8B9EAB-9194-C349-939B-458D4FF5A6A9}" type="slidenum">
+              <a:rPr lang="en-US" smtClean="0"/>
+              <a:t>15</a:t>
+            </a:fld>
+            <a:endParaRPr lang="en-US"/>
+          </a:p>
+        </p:txBody>
+      </p:sp>
+    </p:spTree>
+    <p:extLst>
+      <p:ext uri="{BB962C8B-B14F-4D97-AF65-F5344CB8AC3E}">
+        <p14:creationId xmlns:p14="http://schemas.microsoft.com/office/powerpoint/2010/main" val="3538134952"/>
+      </p:ext>
+    </p:extLst>
+  </p:cSld>
+  <p:clrMapOvr>
+    <a:masterClrMapping/>
+  </p:clrMapOvr>
+</p:notes>
+</file>
+
 <file path=ppt/slideLayouts/slideLayout1.xml><?xml version="1.0" encoding="utf-8"?>
 <p:sldLayout xmlns:a="http://schemas.openxmlformats.org/drawingml/2006/main" xmlns:r="http://schemas.openxmlformats.org/officeDocument/2006/relationships" xmlns:p="http://schemas.openxmlformats.org/presentationml/2006/main" showMasterSp="0" type="title" preserve="1">
   <p:cSld name="Title Slide">
@@ -1042,7 +1458,7 @@
           <a:p>
             <a:fld id="{55004B5D-1CA2-CD4C-BA45-D2797EC0AABB}" type="datetimeFigureOut">
               <a:rPr lang="en-US" smtClean="0"/>
-              <a:t>8/23/16</a:t>
+              <a:t>9/12/16</a:t>
             </a:fld>
             <a:endParaRPr lang="en-US"/>
           </a:p>
@@ -1233,7 +1649,7 @@
           <a:p>
             <a:fld id="{55004B5D-1CA2-CD4C-BA45-D2797EC0AABB}" type="datetimeFigureOut">
               <a:rPr lang="en-US" smtClean="0"/>
-              <a:t>8/23/16</a:t>
+              <a:t>9/12/16</a:t>
             </a:fld>
             <a:endParaRPr lang="en-US"/>
           </a:p>
@@ -1413,7 +1829,7 @@
           <a:p>
             <a:fld id="{55004B5D-1CA2-CD4C-BA45-D2797EC0AABB}" type="datetimeFigureOut">
               <a:rPr lang="en-US" smtClean="0"/>
-              <a:t>8/23/16</a:t>
+              <a:t>9/12/16</a:t>
             </a:fld>
             <a:endParaRPr lang="en-US"/>
           </a:p>
@@ -1676,7 +2092,7 @@
           <a:p>
             <a:fld id="{55004B5D-1CA2-CD4C-BA45-D2797EC0AABB}" type="datetimeFigureOut">
               <a:rPr lang="en-US" smtClean="0"/>
-              <a:t>8/23/16</a:t>
+              <a:t>9/12/16</a:t>
             </a:fld>
             <a:endParaRPr lang="en-US"/>
           </a:p>
@@ -2087,7 +2503,7 @@
           <a:p>
             <a:fld id="{55004B5D-1CA2-CD4C-BA45-D2797EC0AABB}" type="datetimeFigureOut">
               <a:rPr lang="en-US" smtClean="0"/>
-              <a:t>8/23/16</a:t>
+              <a:t>9/12/16</a:t>
             </a:fld>
             <a:endParaRPr lang="en-US"/>
           </a:p>
@@ -2329,7 +2745,7 @@
           <a:p>
             <a:fld id="{55004B5D-1CA2-CD4C-BA45-D2797EC0AABB}" type="datetimeFigureOut">
               <a:rPr lang="en-US" smtClean="0"/>
-              <a:t>8/23/16</a:t>
+              <a:t>9/12/16</a:t>
             </a:fld>
             <a:endParaRPr lang="en-US"/>
           </a:p>
@@ -2565,7 +2981,7 @@
           <a:p>
             <a:fld id="{55004B5D-1CA2-CD4C-BA45-D2797EC0AABB}" type="datetimeFigureOut">
               <a:rPr lang="en-US" smtClean="0"/>
-              <a:t>8/23/16</a:t>
+              <a:t>9/12/16</a:t>
             </a:fld>
             <a:endParaRPr lang="en-US"/>
           </a:p>
@@ -2760,7 +3176,7 @@
           <a:p>
             <a:fld id="{55004B5D-1CA2-CD4C-BA45-D2797EC0AABB}" type="datetimeFigureOut">
               <a:rPr lang="en-US" smtClean="0"/>
-              <a:t>8/23/16</a:t>
+              <a:t>9/12/16</a:t>
             </a:fld>
             <a:endParaRPr lang="en-US"/>
           </a:p>
@@ -2858,7 +3274,7 @@
           <a:p>
             <a:fld id="{55004B5D-1CA2-CD4C-BA45-D2797EC0AABB}" type="datetimeFigureOut">
               <a:rPr lang="en-US" smtClean="0"/>
-              <a:t>8/23/16</a:t>
+              <a:t>9/12/16</a:t>
             </a:fld>
             <a:endParaRPr lang="en-US"/>
           </a:p>
@@ -2994,7 +3410,7 @@
           <a:p>
             <a:fld id="{55004B5D-1CA2-CD4C-BA45-D2797EC0AABB}" type="datetimeFigureOut">
               <a:rPr lang="en-US" smtClean="0"/>
-              <a:t>8/23/16</a:t>
+              <a:t>9/12/16</a:t>
             </a:fld>
             <a:endParaRPr lang="en-US"/>
           </a:p>
@@ -3507,7 +3923,7 @@
           <a:p>
             <a:fld id="{55004B5D-1CA2-CD4C-BA45-D2797EC0AABB}" type="datetimeFigureOut">
               <a:rPr lang="en-US" smtClean="0"/>
-              <a:t>8/23/16</a:t>
+              <a:t>9/12/16</a:t>
             </a:fld>
             <a:endParaRPr lang="en-US"/>
           </a:p>
@@ -3768,7 +4184,7 @@
           <a:p>
             <a:fld id="{55004B5D-1CA2-CD4C-BA45-D2797EC0AABB}" type="datetimeFigureOut">
               <a:rPr lang="en-US" smtClean="0"/>
-              <a:t>8/23/16</a:t>
+              <a:t>9/12/16</a:t>
             </a:fld>
             <a:endParaRPr lang="en-US"/>
           </a:p>
@@ -4379,7 +4795,15 @@
           <a:p>
             <a:r>
               <a:rPr lang="en-US" sz="3600" dirty="0" smtClean="0"/>
-              <a:t>Problem with “Grievances Result from Structural or Material Conditions” Argument</a:t>
+              <a:t>Problem with </a:t>
+            </a:r>
+            <a:r>
+              <a:rPr lang="en-US" sz="3600" dirty="0" smtClean="0"/>
+              <a:t>“Inequality” </a:t>
+            </a:r>
+            <a:r>
+              <a:rPr lang="en-US" sz="3600" dirty="0" smtClean="0"/>
+              <a:t>Argument</a:t>
             </a:r>
             <a:endParaRPr lang="en-US" sz="3600" dirty="0"/>
           </a:p>
@@ -4401,27 +4825,34 @@
           <a:lstStyle/>
           <a:p>
             <a:r>
+              <a:rPr lang="en-US" dirty="0" smtClean="0"/>
+              <a:t>Groups </a:t>
+            </a:r>
+            <a:r>
+              <a:rPr lang="en-US" dirty="0" smtClean="0"/>
+              <a:t>are hierarchically situated in </a:t>
+            </a:r>
+            <a:r>
               <a:rPr lang="en-US" dirty="0"/>
-              <a:t>C</a:t>
-            </a:r>
-            <a:r>
-              <a:rPr lang="en-US" dirty="0" smtClean="0"/>
-              <a:t>onflict (over the distribution of resources, rewards, opportunity) is ubiquitous</a:t>
-            </a:r>
-          </a:p>
-          <a:p>
-            <a:pPr lvl="1"/>
+              <a:t>the social </a:t>
+            </a:r>
+            <a:r>
+              <a:rPr lang="en-US" dirty="0" smtClean="0"/>
+              <a:t>system, yet </a:t>
+            </a:r>
             <a:r>
               <a:rPr lang="en-US" dirty="0"/>
-              <a:t>All social groups differentially situated hierarchically in the social </a:t>
-            </a:r>
-            <a:r>
-              <a:rPr lang="en-US" dirty="0" smtClean="0"/>
-              <a:t>system, yet conflicts don’t always materialize</a:t>
-            </a:r>
-          </a:p>
-          <a:p>
-            <a:pPr lvl="1"/>
+              <a:t>conflicts (over the distribution of resources, rewards, opportunity) </a:t>
+            </a:r>
+            <a:r>
+              <a:rPr lang="en-US" dirty="0" smtClean="0"/>
+              <a:t>don’t always materialize</a:t>
+            </a:r>
+          </a:p>
+          <a:p>
+            <a:endParaRPr lang="en-US" dirty="0" smtClean="0"/>
+          </a:p>
+          <a:p>
             <a:r>
               <a:rPr lang="en-US" dirty="0" smtClean="0"/>
               <a:t>If conflicts do arise, doesn’t always translate into mobilizing grievances</a:t>
@@ -4499,13 +4930,31 @@
           <a:lstStyle/>
           <a:p>
             <a:r>
-              <a:rPr lang="en-US" smtClean="0"/>
+              <a:rPr lang="en-US" dirty="0" smtClean="0"/>
               <a:t>Strain</a:t>
             </a:r>
           </a:p>
           <a:p>
             <a:pPr lvl="1"/>
-            <a:endParaRPr lang="en-US"/>
+            <a:r>
+              <a:rPr lang="en-US" dirty="0" smtClean="0"/>
+              <a:t>Disintegration</a:t>
+            </a:r>
+          </a:p>
+          <a:p>
+            <a:pPr lvl="2"/>
+            <a:r>
+              <a:rPr lang="en-US" dirty="0" smtClean="0"/>
+              <a:t>Disruptive social changes/breakdown in traditional social arrangements make people aggrieved and disconnected from one another, making them more vulnerable to appeals of movements</a:t>
+            </a:r>
+          </a:p>
+          <a:p>
+            <a:pPr lvl="3"/>
+            <a:r>
+              <a:rPr lang="en-US" dirty="0" smtClean="0"/>
+              <a:t>War, natural disaster, adverse economic trends</a:t>
+            </a:r>
+            <a:endParaRPr lang="en-US" dirty="0"/>
           </a:p>
         </p:txBody>
       </p:sp>
@@ -4513,6 +4962,509 @@
     <p:extLst>
       <p:ext uri="{BB962C8B-B14F-4D97-AF65-F5344CB8AC3E}">
         <p14:creationId xmlns:p14="http://schemas.microsoft.com/office/powerpoint/2010/main" val="2229254799"/>
+      </p:ext>
+    </p:extLst>
+  </p:cSld>
+  <p:clrMapOvr>
+    <a:masterClrMapping/>
+  </p:clrMapOvr>
+</p:sld>
+</file>
+
+<file path=ppt/slides/slide12.xml><?xml version="1.0" encoding="utf-8"?>
+<p:sld xmlns:a="http://schemas.openxmlformats.org/drawingml/2006/main" xmlns:r="http://schemas.openxmlformats.org/officeDocument/2006/relationships" xmlns:p="http://schemas.openxmlformats.org/presentationml/2006/main">
+  <p:cSld>
+    <p:spTree>
+      <p:nvGrpSpPr>
+        <p:cNvPr id="1" name=""/>
+        <p:cNvGrpSpPr/>
+        <p:nvPr/>
+      </p:nvGrpSpPr>
+      <p:grpSpPr>
+        <a:xfrm>
+          <a:off x="0" y="0"/>
+          <a:ext cx="0" cy="0"/>
+          <a:chOff x="0" y="0"/>
+          <a:chExt cx="0" cy="0"/>
+        </a:xfrm>
+      </p:grpSpPr>
+      <p:sp>
+        <p:nvSpPr>
+          <p:cNvPr id="2" name="Title 1"/>
+          <p:cNvSpPr>
+            <a:spLocks noGrp="1"/>
+          </p:cNvSpPr>
+          <p:nvPr>
+            <p:ph type="title"/>
+          </p:nvPr>
+        </p:nvSpPr>
+        <p:spPr/>
+        <p:txBody>
+          <a:bodyPr>
+            <a:noAutofit/>
+          </a:bodyPr>
+          <a:lstStyle/>
+          <a:p>
+            <a:r>
+              <a:rPr lang="en-US" sz="3600" dirty="0"/>
+              <a:t>Problem with </a:t>
+            </a:r>
+            <a:r>
+              <a:rPr lang="en-US" sz="3600" dirty="0" smtClean="0"/>
+              <a:t>“Strain” Argument</a:t>
+            </a:r>
+            <a:endParaRPr lang="en-US" sz="3600" dirty="0"/>
+          </a:p>
+        </p:txBody>
+      </p:sp>
+      <p:sp>
+        <p:nvSpPr>
+          <p:cNvPr id="3" name="Content Placeholder 2"/>
+          <p:cNvSpPr>
+            <a:spLocks noGrp="1"/>
+          </p:cNvSpPr>
+          <p:nvPr>
+            <p:ph sz="quarter" idx="1"/>
+          </p:nvPr>
+        </p:nvSpPr>
+        <p:spPr/>
+        <p:txBody>
+          <a:bodyPr/>
+          <a:lstStyle/>
+          <a:p>
+            <a:r>
+              <a:rPr lang="en-US" dirty="0" smtClean="0"/>
+              <a:t>Disorganized or socially atomized people rarely involved in protest</a:t>
+            </a:r>
+          </a:p>
+          <a:p>
+            <a:pPr lvl="1"/>
+            <a:r>
+              <a:rPr lang="en-US" dirty="0" smtClean="0"/>
+              <a:t>Participation is conducted by those who are heavily organized</a:t>
+            </a:r>
+            <a:endParaRPr lang="en-US" dirty="0"/>
+          </a:p>
+        </p:txBody>
+      </p:sp>
+    </p:spTree>
+    <p:extLst>
+      <p:ext uri="{BB962C8B-B14F-4D97-AF65-F5344CB8AC3E}">
+        <p14:creationId xmlns:p14="http://schemas.microsoft.com/office/powerpoint/2010/main" val="549270741"/>
+      </p:ext>
+    </p:extLst>
+  </p:cSld>
+  <p:clrMapOvr>
+    <a:masterClrMapping/>
+  </p:clrMapOvr>
+</p:sld>
+</file>
+
+<file path=ppt/slides/slide13.xml><?xml version="1.0" encoding="utf-8"?>
+<p:sld xmlns:a="http://schemas.openxmlformats.org/drawingml/2006/main" xmlns:r="http://schemas.openxmlformats.org/officeDocument/2006/relationships" xmlns:p="http://schemas.openxmlformats.org/presentationml/2006/main">
+  <p:cSld>
+    <p:spTree>
+      <p:nvGrpSpPr>
+        <p:cNvPr id="1" name=""/>
+        <p:cNvGrpSpPr/>
+        <p:nvPr/>
+      </p:nvGrpSpPr>
+      <p:grpSpPr>
+        <a:xfrm>
+          <a:off x="0" y="0"/>
+          <a:ext cx="0" cy="0"/>
+          <a:chOff x="0" y="0"/>
+          <a:chExt cx="0" cy="0"/>
+        </a:xfrm>
+      </p:grpSpPr>
+      <p:sp>
+        <p:nvSpPr>
+          <p:cNvPr id="2" name="Title 1"/>
+          <p:cNvSpPr>
+            <a:spLocks noGrp="1"/>
+          </p:cNvSpPr>
+          <p:nvPr>
+            <p:ph type="title"/>
+          </p:nvPr>
+        </p:nvSpPr>
+        <p:spPr/>
+        <p:txBody>
+          <a:bodyPr>
+            <a:normAutofit fontScale="90000"/>
+          </a:bodyPr>
+          <a:lstStyle/>
+          <a:p>
+            <a:r>
+              <a:rPr lang="en-US" dirty="0"/>
+              <a:t>Grievances as Function of Objective Structural or Material Conditions</a:t>
+            </a:r>
+          </a:p>
+        </p:txBody>
+      </p:sp>
+      <p:sp>
+        <p:nvSpPr>
+          <p:cNvPr id="3" name="Content Placeholder 2"/>
+          <p:cNvSpPr>
+            <a:spLocks noGrp="1"/>
+          </p:cNvSpPr>
+          <p:nvPr>
+            <p:ph sz="quarter" idx="1"/>
+          </p:nvPr>
+        </p:nvSpPr>
+        <p:spPr/>
+        <p:txBody>
+          <a:bodyPr/>
+          <a:lstStyle/>
+          <a:p>
+            <a:r>
+              <a:rPr lang="en-US" dirty="0" smtClean="0"/>
+              <a:t>Strain</a:t>
+            </a:r>
+          </a:p>
+          <a:p>
+            <a:pPr lvl="1"/>
+            <a:r>
+              <a:rPr lang="en-US" dirty="0" smtClean="0"/>
+              <a:t>Absolute Deprivation</a:t>
+            </a:r>
+            <a:endParaRPr lang="en-US" dirty="0" smtClean="0"/>
+          </a:p>
+          <a:p>
+            <a:pPr lvl="2"/>
+            <a:r>
+              <a:rPr lang="en-US" dirty="0" smtClean="0"/>
+              <a:t>Dire social conditions </a:t>
+            </a:r>
+            <a:r>
+              <a:rPr lang="en-US" dirty="0" smtClean="0"/>
+              <a:t>are a source of grievances and make people </a:t>
+            </a:r>
+            <a:r>
+              <a:rPr lang="en-US" dirty="0" smtClean="0"/>
+              <a:t>more </a:t>
+            </a:r>
+            <a:r>
+              <a:rPr lang="en-US" dirty="0" smtClean="0"/>
+              <a:t>vulnerable to appeals of movements</a:t>
+            </a:r>
+          </a:p>
+          <a:p>
+            <a:pPr lvl="3"/>
+            <a:r>
+              <a:rPr lang="en-US" dirty="0" smtClean="0"/>
+              <a:t>Lack of affordable housing, unemployment, inaccessible healthcare, poverty, discrimination</a:t>
+            </a:r>
+            <a:endParaRPr lang="en-US" dirty="0"/>
+          </a:p>
+        </p:txBody>
+      </p:sp>
+    </p:spTree>
+    <p:extLst>
+      <p:ext uri="{BB962C8B-B14F-4D97-AF65-F5344CB8AC3E}">
+        <p14:creationId xmlns:p14="http://schemas.microsoft.com/office/powerpoint/2010/main" val="3210992631"/>
+      </p:ext>
+    </p:extLst>
+  </p:cSld>
+  <p:clrMapOvr>
+    <a:masterClrMapping/>
+  </p:clrMapOvr>
+</p:sld>
+</file>
+
+<file path=ppt/slides/slide14.xml><?xml version="1.0" encoding="utf-8"?>
+<p:sld xmlns:a="http://schemas.openxmlformats.org/drawingml/2006/main" xmlns:r="http://schemas.openxmlformats.org/officeDocument/2006/relationships" xmlns:p="http://schemas.openxmlformats.org/presentationml/2006/main">
+  <p:cSld>
+    <p:spTree>
+      <p:nvGrpSpPr>
+        <p:cNvPr id="1" name=""/>
+        <p:cNvGrpSpPr/>
+        <p:nvPr/>
+      </p:nvGrpSpPr>
+      <p:grpSpPr>
+        <a:xfrm>
+          <a:off x="0" y="0"/>
+          <a:ext cx="0" cy="0"/>
+          <a:chOff x="0" y="0"/>
+          <a:chExt cx="0" cy="0"/>
+        </a:xfrm>
+      </p:grpSpPr>
+      <p:sp>
+        <p:nvSpPr>
+          <p:cNvPr id="2" name="Title 1"/>
+          <p:cNvSpPr>
+            <a:spLocks noGrp="1"/>
+          </p:cNvSpPr>
+          <p:nvPr>
+            <p:ph type="title"/>
+          </p:nvPr>
+        </p:nvSpPr>
+        <p:spPr/>
+        <p:txBody>
+          <a:bodyPr>
+            <a:normAutofit fontScale="90000"/>
+          </a:bodyPr>
+          <a:lstStyle/>
+          <a:p>
+            <a:r>
+              <a:rPr lang="en-US" dirty="0" smtClean="0"/>
+              <a:t>Problem with “Absolute Deprivation” Argument</a:t>
+            </a:r>
+            <a:endParaRPr lang="en-US" dirty="0"/>
+          </a:p>
+        </p:txBody>
+      </p:sp>
+      <p:sp>
+        <p:nvSpPr>
+          <p:cNvPr id="3" name="Content Placeholder 2"/>
+          <p:cNvSpPr>
+            <a:spLocks noGrp="1"/>
+          </p:cNvSpPr>
+          <p:nvPr>
+            <p:ph sz="quarter" idx="1"/>
+          </p:nvPr>
+        </p:nvSpPr>
+        <p:spPr/>
+        <p:txBody>
+          <a:bodyPr/>
+          <a:lstStyle/>
+          <a:p>
+            <a:r>
+              <a:rPr lang="en-US" dirty="0" smtClean="0"/>
+              <a:t>Grievances don’t automatically result from poor life conditions</a:t>
+            </a:r>
+          </a:p>
+          <a:p>
+            <a:r>
+              <a:rPr lang="en-US" dirty="0" smtClean="0"/>
+              <a:t>Research provides mixed findings</a:t>
+            </a:r>
+          </a:p>
+          <a:p>
+            <a:pPr lvl="1"/>
+            <a:r>
+              <a:rPr lang="en-US" dirty="0" smtClean="0"/>
+              <a:t>Black unemployment is both </a:t>
+            </a:r>
+            <a:r>
+              <a:rPr lang="en-US" i="1" dirty="0" smtClean="0"/>
+              <a:t>unrelated to </a:t>
+            </a:r>
+            <a:r>
+              <a:rPr lang="en-US" dirty="0" smtClean="0"/>
+              <a:t>and </a:t>
+            </a:r>
+            <a:r>
+              <a:rPr lang="en-US" i="1" dirty="0" smtClean="0"/>
+              <a:t>significantly associated with </a:t>
+            </a:r>
+            <a:r>
+              <a:rPr lang="en-US" dirty="0" smtClean="0"/>
+              <a:t>black riots</a:t>
+            </a:r>
+            <a:endParaRPr lang="en-US" dirty="0"/>
+          </a:p>
+        </p:txBody>
+      </p:sp>
+    </p:spTree>
+    <p:extLst>
+      <p:ext uri="{BB962C8B-B14F-4D97-AF65-F5344CB8AC3E}">
+        <p14:creationId xmlns:p14="http://schemas.microsoft.com/office/powerpoint/2010/main" val="150826977"/>
+      </p:ext>
+    </p:extLst>
+  </p:cSld>
+  <p:clrMapOvr>
+    <a:masterClrMapping/>
+  </p:clrMapOvr>
+</p:sld>
+</file>
+
+<file path=ppt/slides/slide15.xml><?xml version="1.0" encoding="utf-8"?>
+<p:sld xmlns:a="http://schemas.openxmlformats.org/drawingml/2006/main" xmlns:r="http://schemas.openxmlformats.org/officeDocument/2006/relationships" xmlns:p="http://schemas.openxmlformats.org/presentationml/2006/main">
+  <p:cSld>
+    <p:spTree>
+      <p:nvGrpSpPr>
+        <p:cNvPr id="1" name=""/>
+        <p:cNvGrpSpPr/>
+        <p:nvPr/>
+      </p:nvGrpSpPr>
+      <p:grpSpPr>
+        <a:xfrm>
+          <a:off x="0" y="0"/>
+          <a:ext cx="0" cy="0"/>
+          <a:chOff x="0" y="0"/>
+          <a:chExt cx="0" cy="0"/>
+        </a:xfrm>
+      </p:grpSpPr>
+      <p:sp>
+        <p:nvSpPr>
+          <p:cNvPr id="2" name="Title 1"/>
+          <p:cNvSpPr>
+            <a:spLocks noGrp="1"/>
+          </p:cNvSpPr>
+          <p:nvPr>
+            <p:ph type="title"/>
+          </p:nvPr>
+        </p:nvSpPr>
+        <p:spPr/>
+        <p:txBody>
+          <a:bodyPr>
+            <a:normAutofit fontScale="90000"/>
+          </a:bodyPr>
+          <a:lstStyle/>
+          <a:p>
+            <a:r>
+              <a:rPr lang="en-US" dirty="0"/>
+              <a:t>Grievances as Function of Objective Structural or Material Conditions</a:t>
+            </a:r>
+          </a:p>
+        </p:txBody>
+      </p:sp>
+      <p:sp>
+        <p:nvSpPr>
+          <p:cNvPr id="3" name="Content Placeholder 2"/>
+          <p:cNvSpPr>
+            <a:spLocks noGrp="1"/>
+          </p:cNvSpPr>
+          <p:nvPr>
+            <p:ph sz="quarter" idx="1"/>
+          </p:nvPr>
+        </p:nvSpPr>
+        <p:spPr/>
+        <p:txBody>
+          <a:bodyPr/>
+          <a:lstStyle/>
+          <a:p>
+            <a:r>
+              <a:rPr lang="en-US" dirty="0" smtClean="0"/>
+              <a:t>Strain</a:t>
+            </a:r>
+          </a:p>
+          <a:p>
+            <a:pPr lvl="1"/>
+            <a:r>
+              <a:rPr lang="en-US" dirty="0" smtClean="0"/>
+              <a:t>Quotidian Disruption</a:t>
+            </a:r>
+            <a:endParaRPr lang="en-US" dirty="0" smtClean="0"/>
+          </a:p>
+          <a:p>
+            <a:pPr lvl="2"/>
+            <a:r>
+              <a:rPr lang="en-US" dirty="0" smtClean="0"/>
+              <a:t>Grievances spring from disruption and uncertainty in the taken-for-granted, habituated ways of living daily life</a:t>
+            </a:r>
+          </a:p>
+          <a:p>
+            <a:pPr lvl="3"/>
+            <a:r>
+              <a:rPr lang="en-US" dirty="0" smtClean="0"/>
+              <a:t>Human-made disasters that threaten the existence and functioning of a community (e.g. </a:t>
+            </a:r>
+            <a:r>
+              <a:rPr lang="en-US" dirty="0" smtClean="0"/>
+              <a:t>nuclear meltdown at Three Mile Island)</a:t>
+            </a:r>
+          </a:p>
+          <a:p>
+            <a:pPr lvl="3"/>
+            <a:r>
+              <a:rPr lang="en-US" dirty="0" smtClean="0"/>
+              <a:t>Intrusions into/violations of culturally defined spaces of privacy by outsiders (e.g. homeless </a:t>
+            </a:r>
+            <a:r>
+              <a:rPr lang="en-US" smtClean="0"/>
+              <a:t>shelters built, </a:t>
+            </a:r>
+            <a:endParaRPr lang="en-US" dirty="0"/>
+          </a:p>
+        </p:txBody>
+      </p:sp>
+    </p:spTree>
+    <p:extLst>
+      <p:ext uri="{BB962C8B-B14F-4D97-AF65-F5344CB8AC3E}">
+        <p14:creationId xmlns:p14="http://schemas.microsoft.com/office/powerpoint/2010/main" val="1901355479"/>
+      </p:ext>
+    </p:extLst>
+  </p:cSld>
+  <p:clrMapOvr>
+    <a:masterClrMapping/>
+  </p:clrMapOvr>
+</p:sld>
+</file>
+
+<file path=ppt/slides/slide16.xml><?xml version="1.0" encoding="utf-8"?>
+<p:sld xmlns:a="http://schemas.openxmlformats.org/drawingml/2006/main" xmlns:r="http://schemas.openxmlformats.org/officeDocument/2006/relationships" xmlns:p="http://schemas.openxmlformats.org/presentationml/2006/main">
+  <p:cSld>
+    <p:spTree>
+      <p:nvGrpSpPr>
+        <p:cNvPr id="1" name=""/>
+        <p:cNvGrpSpPr/>
+        <p:nvPr/>
+      </p:nvGrpSpPr>
+      <p:grpSpPr>
+        <a:xfrm>
+          <a:off x="0" y="0"/>
+          <a:ext cx="0" cy="0"/>
+          <a:chOff x="0" y="0"/>
+          <a:chExt cx="0" cy="0"/>
+        </a:xfrm>
+      </p:grpSpPr>
+      <p:sp>
+        <p:nvSpPr>
+          <p:cNvPr id="2" name="Title 1"/>
+          <p:cNvSpPr>
+            <a:spLocks noGrp="1"/>
+          </p:cNvSpPr>
+          <p:nvPr>
+            <p:ph type="title"/>
+          </p:nvPr>
+        </p:nvSpPr>
+        <p:spPr/>
+        <p:txBody>
+          <a:bodyPr>
+            <a:normAutofit fontScale="90000"/>
+          </a:bodyPr>
+          <a:lstStyle/>
+          <a:p>
+            <a:r>
+              <a:rPr lang="en-US" dirty="0"/>
+              <a:t>Grievances as Function of </a:t>
+            </a:r>
+            <a:r>
+              <a:rPr lang="en-US" dirty="0" smtClean="0"/>
+              <a:t>Heightened </a:t>
+            </a:r>
+            <a:r>
+              <a:rPr lang="en-US" smtClean="0"/>
+              <a:t>Psychological States</a:t>
+            </a:r>
+            <a:endParaRPr lang="en-US" dirty="0"/>
+          </a:p>
+        </p:txBody>
+      </p:sp>
+      <p:sp>
+        <p:nvSpPr>
+          <p:cNvPr id="3" name="Content Placeholder 2"/>
+          <p:cNvSpPr>
+            <a:spLocks noGrp="1"/>
+          </p:cNvSpPr>
+          <p:nvPr>
+            <p:ph sz="quarter" idx="1"/>
+          </p:nvPr>
+        </p:nvSpPr>
+        <p:spPr/>
+        <p:txBody>
+          <a:bodyPr/>
+          <a:lstStyle/>
+          <a:p>
+            <a:endParaRPr lang="en-US"/>
+          </a:p>
+        </p:txBody>
+      </p:sp>
+    </p:spTree>
+    <p:extLst>
+      <p:ext uri="{BB962C8B-B14F-4D97-AF65-F5344CB8AC3E}">
+        <p14:creationId xmlns:p14="http://schemas.microsoft.com/office/powerpoint/2010/main" val="2707900493"/>
       </p:ext>
     </p:extLst>
   </p:cSld>
@@ -4654,7 +5606,7 @@
           <a:p>
             <a:r>
               <a:rPr lang="en-US" dirty="0" smtClean="0"/>
-              <a:t>Grievances are the primary impetus for social movement emergence and individual participation in movement activity</a:t>
+              <a:t>Grievances are critical for emergence and participation</a:t>
             </a:r>
           </a:p>
           <a:p>
@@ -4737,9 +5689,43 @@
           <a:bodyPr/>
           <a:lstStyle/>
           <a:p>
-            <a:r>
-              <a:rPr lang="en-US" dirty="0" smtClean="0"/>
-              <a:t>Strong feelings/beliefs that are shared among multiple actors (individuals or organizations) and are felt so strongly to warrant collective complaint and corrective, collective action</a:t>
+            <a:pPr marL="514350" indent="-514350">
+              <a:buFont typeface="+mj-lt"/>
+              <a:buAutoNum type="arabicPeriod"/>
+            </a:pPr>
+            <a:r>
+              <a:rPr lang="en-US" dirty="0" smtClean="0"/>
+              <a:t>Strong feelings</a:t>
+            </a:r>
+            <a:r>
+              <a:rPr lang="is-IS" dirty="0" smtClean="0"/>
+              <a:t>…</a:t>
+            </a:r>
+            <a:endParaRPr lang="en-US" dirty="0" smtClean="0"/>
+          </a:p>
+          <a:p>
+            <a:pPr marL="514350" indent="-514350">
+              <a:buFont typeface="+mj-lt"/>
+              <a:buAutoNum type="arabicPeriod"/>
+            </a:pPr>
+            <a:r>
+              <a:rPr lang="en-US" dirty="0" smtClean="0"/>
+              <a:t>shared amongst multiple actors (individuals or organizations)</a:t>
+            </a:r>
+            <a:r>
+              <a:rPr lang="is-IS" dirty="0" smtClean="0"/>
+              <a:t>…</a:t>
+            </a:r>
+            <a:endParaRPr lang="en-US" dirty="0" smtClean="0"/>
+          </a:p>
+          <a:p>
+            <a:pPr marL="514350" indent="-514350">
+              <a:buFont typeface="+mj-lt"/>
+              <a:buAutoNum type="arabicPeriod"/>
+            </a:pPr>
+            <a:r>
+              <a:rPr lang="en-US" dirty="0" smtClean="0"/>
+              <a:t>felt so strongly to warrant collective complaint and corrective, collective action</a:t>
             </a:r>
             <a:endParaRPr lang="en-US" dirty="0"/>
           </a:p>
@@ -4817,19 +5803,28 @@
           <a:p>
             <a:r>
               <a:rPr lang="en-US" dirty="0" smtClean="0"/>
-              <a:t>Grievances are ubiquitous and therefore inconsequential for movement activity</a:t>
-            </a:r>
-          </a:p>
-          <a:p>
-            <a:r>
-              <a:rPr lang="en-US" dirty="0" smtClean="0"/>
-              <a:t>Grievances result from specifiable objective, structural or material conditions</a:t>
-            </a:r>
-          </a:p>
-          <a:p>
-            <a:r>
-              <a:rPr lang="en-US" dirty="0" smtClean="0"/>
-              <a:t>Grievances are primarily just heightened psychological states</a:t>
+              <a:t>Grievances are </a:t>
+            </a:r>
+            <a:r>
+              <a:rPr lang="en-US" dirty="0" smtClean="0"/>
+              <a:t>ubiquitous, therefore inconsequential</a:t>
+            </a:r>
+            <a:endParaRPr lang="en-US" dirty="0" smtClean="0"/>
+          </a:p>
+          <a:p>
+            <a:r>
+              <a:rPr lang="en-US" dirty="0" smtClean="0"/>
+              <a:t>Grievances only result </a:t>
+            </a:r>
+            <a:r>
+              <a:rPr lang="en-US" dirty="0" smtClean="0"/>
+              <a:t>from objective structural or material conditions</a:t>
+            </a:r>
+          </a:p>
+          <a:p>
+            <a:r>
+              <a:rPr lang="en-US" dirty="0" smtClean="0"/>
+              <a:t>Grievances simply heightened psychological states</a:t>
             </a:r>
             <a:endParaRPr lang="en-US" dirty="0"/>
           </a:p>
@@ -4909,7 +5904,7 @@
           <a:p>
             <a:r>
               <a:rPr lang="en-US" dirty="0" smtClean="0"/>
-              <a:t>Grievances, much like weeds, flourish naturally and abundantly, irrespective of environmental context or social conditions.</a:t>
+              <a:t>“Grievances, much like weeds, flourish naturally and abundantly, irrespective of environmental context or social conditions.”</a:t>
             </a:r>
           </a:p>
           <a:p>
@@ -4918,8 +5913,17 @@
           <a:p>
             <a:r>
               <a:rPr lang="en-US" dirty="0" smtClean="0"/>
-              <a:t>Grievances omnipresent. “There is always enough discontent in any society to supply grassroots support for a movement,” yet movements aren’t always active</a:t>
-            </a:r>
+              <a:t>Grievances omnipresent. “There is always enough discontent in any society to supply grassroots support for a movement</a:t>
+            </a:r>
+            <a:r>
+              <a:rPr lang="is-IS" dirty="0" smtClean="0"/>
+              <a:t>…</a:t>
+            </a:r>
+            <a:r>
+              <a:rPr lang="en-US" smtClean="0"/>
+              <a:t>"</a:t>
+            </a:r>
+            <a:endParaRPr lang="en-US" dirty="0" smtClean="0"/>
           </a:p>
         </p:txBody>
       </p:sp>
@@ -4988,9 +5992,16 @@
             <p:ph sz="quarter" idx="1"/>
           </p:nvPr>
         </p:nvSpPr>
-        <p:spPr/>
-        <p:txBody>
-          <a:bodyPr/>
+        <p:spPr>
+          <a:xfrm>
+            <a:off x="612648" y="1651000"/>
+            <a:ext cx="8153400" cy="4495800"/>
+          </a:xfrm>
+        </p:spPr>
+        <p:txBody>
+          <a:bodyPr>
+            <a:normAutofit fontScale="92500" lnSpcReduction="10000"/>
+          </a:bodyPr>
           <a:lstStyle/>
           <a:p>
             <a:r>
@@ -5016,7 +6027,7 @@
             <a:pPr lvl="2"/>
             <a:r>
               <a:rPr lang="en-US" dirty="0" smtClean="0"/>
-              <a:t>Rarely congeal into collectively shared (mobilizing) grievances that spur collective action</a:t>
+              <a:t>Not getting a raise, traffic, etc.</a:t>
             </a:r>
           </a:p>
           <a:p>
@@ -5033,6 +6044,36 @@
               </a:rPr>
               <a:t> (1993)</a:t>
             </a:r>
+            <a:endParaRPr lang="en-US" dirty="0"/>
+          </a:p>
+          <a:p>
+            <a:pPr lvl="2"/>
+            <a:endParaRPr lang="en-US" dirty="0" smtClean="0"/>
+          </a:p>
+          <a:p>
+            <a:r>
+              <a:rPr lang="en-US" dirty="0" smtClean="0"/>
+              <a:t>Individual grievances rarely </a:t>
+            </a:r>
+            <a:r>
+              <a:rPr lang="en-US" dirty="0"/>
+              <a:t>congeal into collectively shared (mobilizing) grievances that spur collective </a:t>
+            </a:r>
+            <a:r>
+              <a:rPr lang="en-US" dirty="0" smtClean="0"/>
+              <a:t>action</a:t>
+            </a:r>
+          </a:p>
+          <a:p>
+            <a:pPr lvl="1"/>
+            <a:r>
+              <a:rPr lang="en-US" dirty="0" smtClean="0"/>
+              <a:t>Movements aren't always active</a:t>
+            </a:r>
+            <a:endParaRPr lang="en-US" dirty="0"/>
+          </a:p>
+          <a:p>
+            <a:pPr lvl="1"/>
             <a:endParaRPr lang="en-US" dirty="0" smtClean="0"/>
           </a:p>
           <a:p>
@@ -5126,7 +6167,7 @@
             <a:pPr lvl="2"/>
             <a:r>
               <a:rPr lang="en-US" dirty="0" smtClean="0"/>
-              <a:t>Social arrangements that place certain social groups (aggregates of individuals) in antagonistic relations with one another</a:t>
+              <a:t>Social arrangements that places certain social groups in antagonistic relations with one another</a:t>
             </a:r>
           </a:p>
           <a:p>
@@ -5140,7 +6181,18 @@
             <a:pPr lvl="2"/>
             <a:r>
               <a:rPr lang="en-US" dirty="0" smtClean="0"/>
-              <a:t>Changes/trends that alter existing social arrangements and patterns of social life</a:t>
+              <a:t>Changes/trends that alter existing social arrangements and patterns of social </a:t>
+            </a:r>
+            <a:r>
+              <a:rPr lang="en-US" dirty="0" smtClean="0"/>
+              <a:t>life</a:t>
+            </a:r>
+          </a:p>
+          <a:p>
+            <a:pPr lvl="3"/>
+            <a:r>
+              <a:rPr lang="en-US" dirty="0" smtClean="0"/>
+              <a:t>Disintegration, Absolute Deprivation, Quotidian Disruption</a:t>
             </a:r>
             <a:endParaRPr lang="en-US" dirty="0"/>
           </a:p>
@@ -5230,10 +6282,7 @@
           </a:p>
           <a:p>
             <a:pPr lvl="1"/>
-            <a:r>
-              <a:rPr lang="en-US" dirty="0" smtClean="0"/>
-              <a:t>Grievances rooted in conflicts over claims to rewards and opportunities among groups differentially situated in the social system</a:t>
-            </a:r>
+            <a:endParaRPr lang="en-US" dirty="0" smtClean="0"/>
           </a:p>
         </p:txBody>
       </p:sp>

</xml_diff>